<commit_message>
Java alapok - tipo fixes
</commit_message>
<xml_diff>
--- a/documentation/03_JavaAlapok/doc/14 Java alapok ismétlése - Java nyelvi elemek, változók, operátorok, vezérlési szerkezetek .pptx
+++ b/documentation/03_JavaAlapok/doc/14 Java alapok ismétlése - Java nyelvi elemek, változók, operátorok, vezérlési szerkezetek .pptx
@@ -485,7 +485,7 @@
   <p:cSld>
     <p:spTree>
       <p:nvGrpSpPr>
-        <p:cNvPr id="143" name="Shape 143"/>
+        <p:cNvPr id="142" name="Shape 142"/>
         <p:cNvGrpSpPr/>
         <p:nvPr/>
       </p:nvGrpSpPr>
@@ -499,7 +499,7 @@
       </p:grpSpPr>
       <p:sp>
         <p:nvSpPr>
-          <p:cNvPr id="144" name="Shape 144"/>
+          <p:cNvPr id="143" name="Shape 143"/>
           <p:cNvSpPr txBox="1"/>
           <p:nvPr>
             <p:ph idx="1" type="body"/>
@@ -539,7 +539,7 @@
       </p:sp>
       <p:sp>
         <p:nvSpPr>
-          <p:cNvPr id="145" name="Shape 145"/>
+          <p:cNvPr id="144" name="Shape 144"/>
           <p:cNvSpPr/>
           <p:nvPr>
             <p:ph idx="2" type="sldImg"/>
@@ -584,7 +584,7 @@
   <p:cSld>
     <p:spTree>
       <p:nvGrpSpPr>
-        <p:cNvPr id="150" name="Shape 150"/>
+        <p:cNvPr id="149" name="Shape 149"/>
         <p:cNvGrpSpPr/>
         <p:nvPr/>
       </p:nvGrpSpPr>
@@ -598,7 +598,7 @@
       </p:grpSpPr>
       <p:sp>
         <p:nvSpPr>
-          <p:cNvPr id="151" name="Shape 151"/>
+          <p:cNvPr id="150" name="Shape 150"/>
           <p:cNvSpPr txBox="1"/>
           <p:nvPr>
             <p:ph idx="1" type="body"/>
@@ -638,7 +638,7 @@
       </p:sp>
       <p:sp>
         <p:nvSpPr>
-          <p:cNvPr id="152" name="Shape 152"/>
+          <p:cNvPr id="151" name="Shape 151"/>
           <p:cNvSpPr/>
           <p:nvPr>
             <p:ph idx="2" type="sldImg"/>
@@ -683,7 +683,7 @@
   <p:cSld>
     <p:spTree>
       <p:nvGrpSpPr>
-        <p:cNvPr id="158" name="Shape 158"/>
+        <p:cNvPr id="157" name="Shape 157"/>
         <p:cNvGrpSpPr/>
         <p:nvPr/>
       </p:nvGrpSpPr>
@@ -697,7 +697,7 @@
       </p:grpSpPr>
       <p:sp>
         <p:nvSpPr>
-          <p:cNvPr id="159" name="Shape 159"/>
+          <p:cNvPr id="158" name="Shape 158"/>
           <p:cNvSpPr txBox="1"/>
           <p:nvPr>
             <p:ph idx="1" type="body"/>
@@ -737,7 +737,7 @@
       </p:sp>
       <p:sp>
         <p:nvSpPr>
-          <p:cNvPr id="160" name="Shape 160"/>
+          <p:cNvPr id="159" name="Shape 159"/>
           <p:cNvSpPr/>
           <p:nvPr>
             <p:ph idx="2" type="sldImg"/>
@@ -782,7 +782,7 @@
   <p:cSld>
     <p:spTree>
       <p:nvGrpSpPr>
-        <p:cNvPr id="165" name="Shape 165"/>
+        <p:cNvPr id="164" name="Shape 164"/>
         <p:cNvGrpSpPr/>
         <p:nvPr/>
       </p:nvGrpSpPr>
@@ -796,7 +796,7 @@
       </p:grpSpPr>
       <p:sp>
         <p:nvSpPr>
-          <p:cNvPr id="166" name="Shape 166"/>
+          <p:cNvPr id="165" name="Shape 165"/>
           <p:cNvSpPr txBox="1"/>
           <p:nvPr>
             <p:ph idx="1" type="body"/>
@@ -836,7 +836,7 @@
       </p:sp>
       <p:sp>
         <p:nvSpPr>
-          <p:cNvPr id="167" name="Shape 167"/>
+          <p:cNvPr id="166" name="Shape 166"/>
           <p:cNvSpPr/>
           <p:nvPr>
             <p:ph idx="2" type="sldImg"/>
@@ -881,7 +881,7 @@
   <p:cSld>
     <p:spTree>
       <p:nvGrpSpPr>
-        <p:cNvPr id="172" name="Shape 172"/>
+        <p:cNvPr id="171" name="Shape 171"/>
         <p:cNvGrpSpPr/>
         <p:nvPr/>
       </p:nvGrpSpPr>
@@ -895,7 +895,7 @@
       </p:grpSpPr>
       <p:sp>
         <p:nvSpPr>
-          <p:cNvPr id="173" name="Shape 173"/>
+          <p:cNvPr id="172" name="Shape 172"/>
           <p:cNvSpPr txBox="1"/>
           <p:nvPr>
             <p:ph idx="1" type="body"/>
@@ -935,7 +935,7 @@
       </p:sp>
       <p:sp>
         <p:nvSpPr>
-          <p:cNvPr id="174" name="Shape 174"/>
+          <p:cNvPr id="173" name="Shape 173"/>
           <p:cNvSpPr/>
           <p:nvPr>
             <p:ph idx="2" type="sldImg"/>
@@ -980,7 +980,7 @@
   <p:cSld>
     <p:spTree>
       <p:nvGrpSpPr>
-        <p:cNvPr id="179" name="Shape 179"/>
+        <p:cNvPr id="178" name="Shape 178"/>
         <p:cNvGrpSpPr/>
         <p:nvPr/>
       </p:nvGrpSpPr>
@@ -994,7 +994,7 @@
       </p:grpSpPr>
       <p:sp>
         <p:nvSpPr>
-          <p:cNvPr id="180" name="Shape 180"/>
+          <p:cNvPr id="179" name="Shape 179"/>
           <p:cNvSpPr txBox="1"/>
           <p:nvPr>
             <p:ph idx="1" type="body"/>
@@ -1034,7 +1034,7 @@
       </p:sp>
       <p:sp>
         <p:nvSpPr>
-          <p:cNvPr id="181" name="Shape 181"/>
+          <p:cNvPr id="180" name="Shape 180"/>
           <p:cNvSpPr/>
           <p:nvPr>
             <p:ph idx="2" type="sldImg"/>
@@ -1079,7 +1079,7 @@
   <p:cSld>
     <p:spTree>
       <p:nvGrpSpPr>
-        <p:cNvPr id="186" name="Shape 186"/>
+        <p:cNvPr id="185" name="Shape 185"/>
         <p:cNvGrpSpPr/>
         <p:nvPr/>
       </p:nvGrpSpPr>
@@ -1093,7 +1093,7 @@
       </p:grpSpPr>
       <p:sp>
         <p:nvSpPr>
-          <p:cNvPr id="187" name="Shape 187"/>
+          <p:cNvPr id="186" name="Shape 186"/>
           <p:cNvSpPr txBox="1"/>
           <p:nvPr>
             <p:ph idx="1" type="body"/>
@@ -1133,7 +1133,7 @@
       </p:sp>
       <p:sp>
         <p:nvSpPr>
-          <p:cNvPr id="188" name="Shape 188"/>
+          <p:cNvPr id="187" name="Shape 187"/>
           <p:cNvSpPr/>
           <p:nvPr>
             <p:ph idx="2" type="sldImg"/>
@@ -1673,7 +1673,7 @@
   <p:cSld>
     <p:spTree>
       <p:nvGrpSpPr>
-        <p:cNvPr id="122" name="Shape 122"/>
+        <p:cNvPr id="121" name="Shape 121"/>
         <p:cNvGrpSpPr/>
         <p:nvPr/>
       </p:nvGrpSpPr>
@@ -1687,7 +1687,7 @@
       </p:grpSpPr>
       <p:sp>
         <p:nvSpPr>
-          <p:cNvPr id="123" name="Shape 123"/>
+          <p:cNvPr id="122" name="Shape 122"/>
           <p:cNvSpPr txBox="1"/>
           <p:nvPr>
             <p:ph idx="1" type="body"/>
@@ -1727,7 +1727,7 @@
       </p:sp>
       <p:sp>
         <p:nvSpPr>
-          <p:cNvPr id="124" name="Shape 124"/>
+          <p:cNvPr id="123" name="Shape 123"/>
           <p:cNvSpPr/>
           <p:nvPr>
             <p:ph idx="2" type="sldImg"/>
@@ -1772,7 +1772,7 @@
   <p:cSld>
     <p:spTree>
       <p:nvGrpSpPr>
-        <p:cNvPr id="129" name="Shape 129"/>
+        <p:cNvPr id="128" name="Shape 128"/>
         <p:cNvGrpSpPr/>
         <p:nvPr/>
       </p:nvGrpSpPr>
@@ -1786,7 +1786,7 @@
       </p:grpSpPr>
       <p:sp>
         <p:nvSpPr>
-          <p:cNvPr id="130" name="Shape 130"/>
+          <p:cNvPr id="129" name="Shape 129"/>
           <p:cNvSpPr txBox="1"/>
           <p:nvPr>
             <p:ph idx="1" type="body"/>
@@ -1826,7 +1826,7 @@
       </p:sp>
       <p:sp>
         <p:nvSpPr>
-          <p:cNvPr id="131" name="Shape 131"/>
+          <p:cNvPr id="130" name="Shape 130"/>
           <p:cNvSpPr/>
           <p:nvPr>
             <p:ph idx="2" type="sldImg"/>
@@ -1871,7 +1871,7 @@
   <p:cSld>
     <p:spTree>
       <p:nvGrpSpPr>
-        <p:cNvPr id="136" name="Shape 136"/>
+        <p:cNvPr id="135" name="Shape 135"/>
         <p:cNvGrpSpPr/>
         <p:nvPr/>
       </p:nvGrpSpPr>
@@ -1885,7 +1885,7 @@
       </p:grpSpPr>
       <p:sp>
         <p:nvSpPr>
-          <p:cNvPr id="137" name="Shape 137"/>
+          <p:cNvPr id="136" name="Shape 136"/>
           <p:cNvSpPr txBox="1"/>
           <p:nvPr>
             <p:ph idx="1" type="body"/>
@@ -1925,7 +1925,7 @@
       </p:sp>
       <p:sp>
         <p:nvSpPr>
-          <p:cNvPr id="138" name="Shape 138"/>
+          <p:cNvPr id="137" name="Shape 137"/>
           <p:cNvSpPr/>
           <p:nvPr>
             <p:ph idx="2" type="sldImg"/>
@@ -12216,7 +12216,7 @@
   <p:cSld>
     <p:spTree>
       <p:nvGrpSpPr>
-        <p:cNvPr id="146" name="Shape 146"/>
+        <p:cNvPr id="145" name="Shape 145"/>
         <p:cNvGrpSpPr/>
         <p:nvPr/>
       </p:nvGrpSpPr>
@@ -12230,7 +12230,7 @@
       </p:grpSpPr>
       <p:sp>
         <p:nvSpPr>
-          <p:cNvPr id="147" name="Shape 147"/>
+          <p:cNvPr id="146" name="Shape 146"/>
           <p:cNvSpPr txBox="1"/>
           <p:nvPr>
             <p:ph type="ctrTitle"/>
@@ -12309,7 +12309,7 @@
       </p:sp>
       <p:sp>
         <p:nvSpPr>
-          <p:cNvPr id="148" name="Shape 148"/>
+          <p:cNvPr id="147" name="Shape 147"/>
           <p:cNvSpPr txBox="1"/>
           <p:nvPr>
             <p:ph idx="1" type="subTitle"/>
@@ -12365,7 +12365,7 @@
       </p:sp>
       <p:sp>
         <p:nvSpPr>
-          <p:cNvPr id="149" name="Shape 149"/>
+          <p:cNvPr id="148" name="Shape 148"/>
           <p:cNvSpPr txBox="1"/>
           <p:nvPr/>
         </p:nvSpPr>
@@ -12530,7 +12530,7 @@
   <p:cSld>
     <p:spTree>
       <p:nvGrpSpPr>
-        <p:cNvPr id="153" name="Shape 153"/>
+        <p:cNvPr id="152" name="Shape 152"/>
         <p:cNvGrpSpPr/>
         <p:nvPr/>
       </p:nvGrpSpPr>
@@ -12544,7 +12544,7 @@
       </p:grpSpPr>
       <p:sp>
         <p:nvSpPr>
-          <p:cNvPr id="154" name="Shape 154"/>
+          <p:cNvPr id="153" name="Shape 153"/>
           <p:cNvSpPr txBox="1"/>
           <p:nvPr>
             <p:ph type="ctrTitle"/>
@@ -12623,7 +12623,7 @@
       </p:sp>
       <p:sp>
         <p:nvSpPr>
-          <p:cNvPr id="155" name="Shape 155"/>
+          <p:cNvPr id="154" name="Shape 154"/>
           <p:cNvSpPr txBox="1"/>
           <p:nvPr>
             <p:ph idx="1" type="subTitle"/>
@@ -12679,7 +12679,7 @@
       </p:sp>
       <p:sp>
         <p:nvSpPr>
-          <p:cNvPr id="156" name="Shape 156"/>
+          <p:cNvPr id="155" name="Shape 155"/>
           <p:cNvSpPr txBox="1"/>
           <p:nvPr/>
         </p:nvSpPr>
@@ -12725,7 +12725,7 @@
       </p:sp>
       <p:sp>
         <p:nvSpPr>
-          <p:cNvPr id="157" name="Shape 157"/>
+          <p:cNvPr id="156" name="Shape 156"/>
           <p:cNvSpPr/>
           <p:nvPr/>
         </p:nvSpPr>
@@ -13101,7 +13101,7 @@
   <p:cSld>
     <p:spTree>
       <p:nvGrpSpPr>
-        <p:cNvPr id="161" name="Shape 161"/>
+        <p:cNvPr id="160" name="Shape 160"/>
         <p:cNvGrpSpPr/>
         <p:nvPr/>
       </p:nvGrpSpPr>
@@ -13115,7 +13115,7 @@
       </p:grpSpPr>
       <p:sp>
         <p:nvSpPr>
-          <p:cNvPr id="162" name="Shape 162"/>
+          <p:cNvPr id="161" name="Shape 161"/>
           <p:cNvSpPr txBox="1"/>
           <p:nvPr>
             <p:ph type="ctrTitle"/>
@@ -13194,7 +13194,7 @@
       </p:sp>
       <p:sp>
         <p:nvSpPr>
-          <p:cNvPr id="163" name="Shape 163"/>
+          <p:cNvPr id="162" name="Shape 162"/>
           <p:cNvSpPr txBox="1"/>
           <p:nvPr>
             <p:ph idx="1" type="subTitle"/>
@@ -13250,7 +13250,7 @@
       </p:sp>
       <p:sp>
         <p:nvSpPr>
-          <p:cNvPr id="164" name="Shape 164"/>
+          <p:cNvPr id="163" name="Shape 163"/>
           <p:cNvSpPr txBox="1"/>
           <p:nvPr/>
         </p:nvSpPr>
@@ -13666,7 +13666,7 @@
   <p:cSld>
     <p:spTree>
       <p:nvGrpSpPr>
-        <p:cNvPr id="168" name="Shape 168"/>
+        <p:cNvPr id="167" name="Shape 167"/>
         <p:cNvGrpSpPr/>
         <p:nvPr/>
       </p:nvGrpSpPr>
@@ -13680,7 +13680,7 @@
       </p:grpSpPr>
       <p:sp>
         <p:nvSpPr>
-          <p:cNvPr id="169" name="Shape 169"/>
+          <p:cNvPr id="168" name="Shape 168"/>
           <p:cNvSpPr txBox="1"/>
           <p:nvPr>
             <p:ph type="ctrTitle"/>
@@ -13759,7 +13759,7 @@
       </p:sp>
       <p:sp>
         <p:nvSpPr>
-          <p:cNvPr id="170" name="Shape 170"/>
+          <p:cNvPr id="169" name="Shape 169"/>
           <p:cNvSpPr txBox="1"/>
           <p:nvPr>
             <p:ph idx="1" type="subTitle"/>
@@ -13815,7 +13815,7 @@
       </p:sp>
       <p:sp>
         <p:nvSpPr>
-          <p:cNvPr id="171" name="Shape 171"/>
+          <p:cNvPr id="170" name="Shape 170"/>
           <p:cNvSpPr txBox="1"/>
           <p:nvPr/>
         </p:nvSpPr>
@@ -14021,7 +14021,7 @@
   <p:cSld>
     <p:spTree>
       <p:nvGrpSpPr>
-        <p:cNvPr id="175" name="Shape 175"/>
+        <p:cNvPr id="174" name="Shape 174"/>
         <p:cNvGrpSpPr/>
         <p:nvPr/>
       </p:nvGrpSpPr>
@@ -14035,7 +14035,7 @@
       </p:grpSpPr>
       <p:sp>
         <p:nvSpPr>
-          <p:cNvPr id="176" name="Shape 176"/>
+          <p:cNvPr id="175" name="Shape 175"/>
           <p:cNvSpPr txBox="1"/>
           <p:nvPr>
             <p:ph type="ctrTitle"/>
@@ -14114,7 +14114,7 @@
       </p:sp>
       <p:sp>
         <p:nvSpPr>
-          <p:cNvPr id="177" name="Shape 177"/>
+          <p:cNvPr id="176" name="Shape 176"/>
           <p:cNvSpPr txBox="1"/>
           <p:nvPr>
             <p:ph idx="1" type="subTitle"/>
@@ -14170,7 +14170,7 @@
       </p:sp>
       <p:sp>
         <p:nvSpPr>
-          <p:cNvPr id="178" name="Shape 178"/>
+          <p:cNvPr id="177" name="Shape 177"/>
           <p:cNvSpPr txBox="1"/>
           <p:nvPr/>
         </p:nvSpPr>
@@ -14417,7 +14417,7 @@
   <p:cSld>
     <p:spTree>
       <p:nvGrpSpPr>
-        <p:cNvPr id="182" name="Shape 182"/>
+        <p:cNvPr id="181" name="Shape 181"/>
         <p:cNvGrpSpPr/>
         <p:nvPr/>
       </p:nvGrpSpPr>
@@ -14431,7 +14431,7 @@
       </p:grpSpPr>
       <p:sp>
         <p:nvSpPr>
-          <p:cNvPr id="183" name="Shape 183"/>
+          <p:cNvPr id="182" name="Shape 182"/>
           <p:cNvSpPr txBox="1"/>
           <p:nvPr>
             <p:ph type="ctrTitle"/>
@@ -14510,7 +14510,7 @@
       </p:sp>
       <p:sp>
         <p:nvSpPr>
-          <p:cNvPr id="184" name="Shape 184"/>
+          <p:cNvPr id="183" name="Shape 183"/>
           <p:cNvSpPr txBox="1"/>
           <p:nvPr>
             <p:ph idx="1" type="subTitle"/>
@@ -14566,7 +14566,7 @@
       </p:sp>
       <p:sp>
         <p:nvSpPr>
-          <p:cNvPr id="185" name="Shape 185"/>
+          <p:cNvPr id="184" name="Shape 184"/>
           <p:cNvSpPr txBox="1"/>
           <p:nvPr/>
         </p:nvSpPr>
@@ -14718,7 +14718,7 @@
     </p:bg>
     <p:spTree>
       <p:nvGrpSpPr>
-        <p:cNvPr id="189" name="Shape 189"/>
+        <p:cNvPr id="188" name="Shape 188"/>
         <p:cNvGrpSpPr/>
         <p:nvPr/>
       </p:nvGrpSpPr>
@@ -14732,7 +14732,7 @@
       </p:grpSpPr>
       <p:sp>
         <p:nvSpPr>
-          <p:cNvPr id="190" name="Shape 190"/>
+          <p:cNvPr id="189" name="Shape 189"/>
           <p:cNvSpPr txBox="1"/>
           <p:nvPr/>
         </p:nvSpPr>
@@ -15652,7 +15652,7 @@
             <a:tbl>
               <a:tblPr>
                 <a:noFill/>
-                <a:tableStyleId>{05D31919-FA5C-4AC0-8897-085705FB4930}</a:tableStyleId>
+                <a:tableStyleId>{4E57E743-97EB-4A9F-83D4-7F98D400DAC0}</a:tableStyleId>
               </a:tblPr>
               <a:tblGrid>
                 <a:gridCol w="4001625"/>
@@ -16984,7 +16984,20 @@
                 <a:cs typeface="Calibri"/>
                 <a:sym typeface="Calibri"/>
               </a:rPr>
-              <a:t>Java 10 - vagy kitudja mikor - megszűnnek a primitív típusok http://www.theregister.co.uk/2012/03/07/oracle_java_9_10_roadmap/</a:t>
+              <a:t>Java 10 - vagy kitudja mikor - megszűnnek a primitív típusok </a:t>
+            </a:r>
+            <a:r>
+              <a:rPr lang="hu-HU" sz="1800" u="sng">
+                <a:solidFill>
+                  <a:schemeClr val="hlink"/>
+                </a:solidFill>
+                <a:latin typeface="Calibri"/>
+                <a:ea typeface="Calibri"/>
+                <a:cs typeface="Calibri"/>
+                <a:sym typeface="Calibri"/>
+                <a:hlinkClick r:id="rId3"/>
+              </a:rPr>
+              <a:t>http://www.theregister.co.uk/2012/03/07/oracle_java_9_10_roadmap/</a:t>
             </a:r>
           </a:p>
           <a:p>
@@ -17176,109 +17189,9 @@
           </a:p>
         </p:txBody>
       </p:sp>
-      <p:sp>
-        <p:nvSpPr>
-          <p:cNvPr id="120" name="Shape 120"/>
-          <p:cNvSpPr txBox="1"/>
-          <p:nvPr/>
-        </p:nvSpPr>
-        <p:spPr>
-          <a:xfrm>
-            <a:off x="238897" y="1500854"/>
-            <a:ext cx="8626241" cy="923329"/>
-          </a:xfrm>
-          <a:prstGeom prst="rect">
-            <a:avLst/>
-          </a:prstGeom>
-          <a:noFill/>
-          <a:ln>
-            <a:noFill/>
-          </a:ln>
-        </p:spPr>
-        <p:txBody>
-          <a:bodyPr anchorCtr="0" anchor="t" bIns="45700" lIns="91425" rIns="91425" tIns="45700">
-            <a:noAutofit/>
-          </a:bodyPr>
-          <a:lstStyle/>
-          <a:p>
-            <a:pPr indent="-285750" lvl="0" marL="285750" marR="0" rtl="0" algn="l">
-              <a:spcBef>
-                <a:spcPts val="0"/>
-              </a:spcBef>
-              <a:buClr>
-                <a:schemeClr val="dk1"/>
-              </a:buClr>
-              <a:buSzPct val="100000"/>
-              <a:buFont typeface="Arial"/>
-              <a:buChar char="•"/>
-            </a:pPr>
-            <a:r>
-              <a:rPr b="0" i="0" lang="hu-HU" sz="1800" u="none" cap="none" strike="noStrike">
-                <a:solidFill>
-                  <a:schemeClr val="dk1"/>
-                </a:solidFill>
-                <a:latin typeface="Calibri"/>
-                <a:ea typeface="Calibri"/>
-                <a:cs typeface="Calibri"/>
-                <a:sym typeface="Calibri"/>
-              </a:rPr>
-              <a:t>java.util.Arrays </a:t>
-            </a:r>
-          </a:p>
-          <a:p>
-            <a:pPr indent="-285750" lvl="0" marL="285750" marR="0" rtl="0" algn="l">
-              <a:spcBef>
-                <a:spcPts val="0"/>
-              </a:spcBef>
-              <a:buClr>
-                <a:schemeClr val="dk1"/>
-              </a:buClr>
-              <a:buSzPct val="100000"/>
-              <a:buFont typeface="Arial"/>
-              <a:buChar char="•"/>
-            </a:pPr>
-            <a:r>
-              <a:rPr b="0" i="0" lang="hu-HU" sz="1800" u="none" cap="none" strike="noStrike">
-                <a:solidFill>
-                  <a:schemeClr val="dk1"/>
-                </a:solidFill>
-                <a:latin typeface="Calibri"/>
-                <a:ea typeface="Calibri"/>
-                <a:cs typeface="Calibri"/>
-                <a:sym typeface="Calibri"/>
-              </a:rPr>
-              <a:t>System.arraycopy</a:t>
-            </a:r>
-          </a:p>
-          <a:p>
-            <a:pPr indent="-285750" lvl="0" marL="285750" marR="0" rtl="0" algn="l">
-              <a:spcBef>
-                <a:spcPts val="0"/>
-              </a:spcBef>
-              <a:buClr>
-                <a:schemeClr val="dk1"/>
-              </a:buClr>
-              <a:buFont typeface="Arial"/>
-              <a:buNone/>
-            </a:pPr>
-            <a:r>
-              <a:t/>
-            </a:r>
-            <a:endParaRPr b="0" i="0" sz="1800" u="none" cap="none" strike="noStrike">
-              <a:solidFill>
-                <a:schemeClr val="dk1"/>
-              </a:solidFill>
-              <a:latin typeface="Calibri"/>
-              <a:ea typeface="Calibri"/>
-              <a:cs typeface="Calibri"/>
-              <a:sym typeface="Calibri"/>
-            </a:endParaRPr>
-          </a:p>
-        </p:txBody>
-      </p:sp>
       <p:pic>
         <p:nvPicPr>
-          <p:cNvPr id="121" name="Shape 121"/>
+          <p:cNvPr id="120" name="Shape 120"/>
           <p:cNvPicPr preferRelativeResize="0"/>
           <p:nvPr/>
         </p:nvPicPr>
@@ -17319,7 +17232,7 @@
   <p:cSld>
     <p:spTree>
       <p:nvGrpSpPr>
-        <p:cNvPr id="125" name="Shape 125"/>
+        <p:cNvPr id="124" name="Shape 124"/>
         <p:cNvGrpSpPr/>
         <p:nvPr/>
       </p:nvGrpSpPr>
@@ -17333,7 +17246,7 @@
       </p:grpSpPr>
       <p:sp>
         <p:nvSpPr>
-          <p:cNvPr id="126" name="Shape 126"/>
+          <p:cNvPr id="125" name="Shape 125"/>
           <p:cNvSpPr txBox="1"/>
           <p:nvPr>
             <p:ph type="ctrTitle"/>
@@ -17412,7 +17325,7 @@
       </p:sp>
       <p:sp>
         <p:nvSpPr>
-          <p:cNvPr id="127" name="Shape 127"/>
+          <p:cNvPr id="126" name="Shape 126"/>
           <p:cNvSpPr txBox="1"/>
           <p:nvPr>
             <p:ph idx="1" type="subTitle"/>
@@ -17468,7 +17381,7 @@
       </p:sp>
       <p:graphicFrame>
         <p:nvGraphicFramePr>
-          <p:cNvPr id="128" name="Shape 128"/>
+          <p:cNvPr id="127" name="Shape 127"/>
           <p:cNvGraphicFramePr/>
           <p:nvPr/>
         </p:nvGraphicFramePr>
@@ -17481,7 +17394,7 @@
             <a:tbl>
               <a:tblPr>
                 <a:noFill/>
-                <a:tableStyleId>{05D31919-FA5C-4AC0-8897-085705FB4930}</a:tableStyleId>
+                <a:tableStyleId>{4E57E743-97EB-4A9F-83D4-7F98D400DAC0}</a:tableStyleId>
               </a:tblPr>
               <a:tblGrid>
                 <a:gridCol w="2828925"/>
@@ -19591,7 +19504,7 @@
   <p:cSld>
     <p:spTree>
       <p:nvGrpSpPr>
-        <p:cNvPr id="132" name="Shape 132"/>
+        <p:cNvPr id="131" name="Shape 131"/>
         <p:cNvGrpSpPr/>
         <p:nvPr/>
       </p:nvGrpSpPr>
@@ -19605,7 +19518,7 @@
       </p:grpSpPr>
       <p:sp>
         <p:nvSpPr>
-          <p:cNvPr id="133" name="Shape 133"/>
+          <p:cNvPr id="132" name="Shape 132"/>
           <p:cNvSpPr txBox="1"/>
           <p:nvPr>
             <p:ph type="ctrTitle"/>
@@ -19684,7 +19597,7 @@
       </p:sp>
       <p:sp>
         <p:nvSpPr>
-          <p:cNvPr id="134" name="Shape 134"/>
+          <p:cNvPr id="133" name="Shape 133"/>
           <p:cNvSpPr txBox="1"/>
           <p:nvPr>
             <p:ph idx="1" type="subTitle"/>
@@ -19740,7 +19653,7 @@
       </p:sp>
       <p:sp>
         <p:nvSpPr>
-          <p:cNvPr id="135" name="Shape 135"/>
+          <p:cNvPr id="134" name="Shape 134"/>
           <p:cNvSpPr txBox="1"/>
           <p:nvPr/>
         </p:nvSpPr>
@@ -19805,7 +19718,7 @@
   <p:cSld>
     <p:spTree>
       <p:nvGrpSpPr>
-        <p:cNvPr id="139" name="Shape 139"/>
+        <p:cNvPr id="138" name="Shape 138"/>
         <p:cNvGrpSpPr/>
         <p:nvPr/>
       </p:nvGrpSpPr>
@@ -19819,7 +19732,7 @@
       </p:grpSpPr>
       <p:sp>
         <p:nvSpPr>
-          <p:cNvPr id="140" name="Shape 140"/>
+          <p:cNvPr id="139" name="Shape 139"/>
           <p:cNvSpPr txBox="1"/>
           <p:nvPr>
             <p:ph type="ctrTitle"/>
@@ -19898,7 +19811,7 @@
       </p:sp>
       <p:sp>
         <p:nvSpPr>
-          <p:cNvPr id="141" name="Shape 141"/>
+          <p:cNvPr id="140" name="Shape 140"/>
           <p:cNvSpPr txBox="1"/>
           <p:nvPr>
             <p:ph idx="1" type="subTitle"/>
@@ -19954,7 +19867,7 @@
       </p:sp>
       <p:sp>
         <p:nvSpPr>
-          <p:cNvPr id="142" name="Shape 142"/>
+          <p:cNvPr id="141" name="Shape 141"/>
           <p:cNvSpPr txBox="1"/>
           <p:nvPr/>
         </p:nvSpPr>
@@ -20057,7 +19970,31 @@
                 <a:cs typeface="Calibri"/>
                 <a:sym typeface="Calibri"/>
               </a:rPr>
-              <a:t>Tetszőleges mélységben egymásba skatulyázható.</a:t>
+              <a:t>Tetszőleges mélységben egymásba </a:t>
+            </a:r>
+            <a:r>
+              <a:rPr lang="hu-HU" sz="1800">
+                <a:solidFill>
+                  <a:schemeClr val="dk1"/>
+                </a:solidFill>
+                <a:latin typeface="Calibri"/>
+                <a:ea typeface="Calibri"/>
+                <a:cs typeface="Calibri"/>
+                <a:sym typeface="Calibri"/>
+              </a:rPr>
+              <a:t>skatulyázható</a:t>
+            </a:r>
+            <a:r>
+              <a:rPr b="0" i="0" lang="hu-HU" sz="1800" u="none" cap="none" strike="noStrike">
+                <a:solidFill>
+                  <a:schemeClr val="dk1"/>
+                </a:solidFill>
+                <a:latin typeface="Calibri"/>
+                <a:ea typeface="Calibri"/>
+                <a:cs typeface="Calibri"/>
+                <a:sym typeface="Calibri"/>
+              </a:rPr>
+              <a:t>.</a:t>
             </a:r>
           </a:p>
           <a:p>
@@ -20078,7 +20015,31 @@
                 <a:cs typeface="Calibri"/>
                 <a:sym typeface="Calibri"/>
               </a:rPr>
-              <a:t>A változó a blokk lokális változójaként deklarálható.</a:t>
+              <a:t>A változó a blokk lokális változójaként </a:t>
+            </a:r>
+            <a:r>
+              <a:rPr lang="hu-HU" sz="1800">
+                <a:solidFill>
+                  <a:schemeClr val="dk1"/>
+                </a:solidFill>
+                <a:latin typeface="Calibri"/>
+                <a:ea typeface="Calibri"/>
+                <a:cs typeface="Calibri"/>
+                <a:sym typeface="Calibri"/>
+              </a:rPr>
+              <a:t>deklarálható</a:t>
+            </a:r>
+            <a:r>
+              <a:rPr b="0" i="0" lang="hu-HU" sz="1800" u="none" cap="none" strike="noStrike">
+                <a:solidFill>
+                  <a:schemeClr val="dk1"/>
+                </a:solidFill>
+                <a:latin typeface="Calibri"/>
+                <a:ea typeface="Calibri"/>
+                <a:cs typeface="Calibri"/>
+                <a:sym typeface="Calibri"/>
+              </a:rPr>
+              <a:t>.</a:t>
             </a:r>
           </a:p>
         </p:txBody>

</xml_diff>